<commit_message>
Added Tests & Actuator to Part 2
</commit_message>
<xml_diff>
--- a/docs/Introduction_To_Microservices_Part_2_boot.pptx
+++ b/docs/Introduction_To_Microservices_Part_2_boot.pptx
@@ -5,7 +5,7 @@
     <p:sldMasterId id="2147483648" r:id="rId1"/>
   </p:sldMasterIdLst>
   <p:notesMasterIdLst>
-    <p:notesMasterId r:id="rId19"/>
+    <p:notesMasterId r:id="rId22"/>
   </p:notesMasterIdLst>
   <p:sldIdLst>
     <p:sldId id="256" r:id="rId2"/>
@@ -25,6 +25,9 @@
     <p:sldId id="263" r:id="rId16"/>
     <p:sldId id="271" r:id="rId17"/>
     <p:sldId id="272" r:id="rId18"/>
+    <p:sldId id="285" r:id="rId19"/>
+    <p:sldId id="284" r:id="rId20"/>
+    <p:sldId id="283" r:id="rId21"/>
   </p:sldIdLst>
   <p:sldSz cx="12192000" cy="6858000"/>
   <p:notesSz cx="6858000" cy="9144000"/>
@@ -8246,7 +8249,7 @@
           <a:p>
             <a:r>
               <a:rPr lang="en-US" dirty="0"/>
-              <a:t>In REST applications controllers are responsible of request mapping</a:t>
+              <a:t>In REST applications controllers are responsible of request mapping. Controllers are by default singletons and should be stateless!</a:t>
             </a:r>
           </a:p>
           <a:p>
@@ -9842,6 +9845,275 @@
 </p:sld>
 </file>
 
+<file path=ppt/slides/slide18.xml><?xml version="1.0" encoding="utf-8"?>
+<p:sld xmlns:a="http://schemas.openxmlformats.org/drawingml/2006/main" xmlns:r="http://schemas.openxmlformats.org/officeDocument/2006/relationships" xmlns:p="http://schemas.openxmlformats.org/presentationml/2006/main">
+  <p:cSld>
+    <p:spTree>
+      <p:nvGrpSpPr>
+        <p:cNvPr id="1" name=""/>
+        <p:cNvGrpSpPr/>
+        <p:nvPr/>
+      </p:nvGrpSpPr>
+      <p:grpSpPr>
+        <a:xfrm>
+          <a:off x="0" y="0"/>
+          <a:ext cx="0" cy="0"/>
+          <a:chOff x="0" y="0"/>
+          <a:chExt cx="0" cy="0"/>
+        </a:xfrm>
+      </p:grpSpPr>
+      <p:sp>
+        <p:nvSpPr>
+          <p:cNvPr id="2" name="Title 1">
+            <a:extLst>
+              <a:ext uri="{FF2B5EF4-FFF2-40B4-BE49-F238E27FC236}">
+                <a16:creationId xmlns:a16="http://schemas.microsoft.com/office/drawing/2014/main" id="{ABE887BB-98D1-4CED-A99D-ED9C1A902C15}"/>
+              </a:ext>
+            </a:extLst>
+          </p:cNvPr>
+          <p:cNvSpPr>
+            <a:spLocks noGrp="1"/>
+          </p:cNvSpPr>
+          <p:nvPr>
+            <p:ph type="title"/>
+          </p:nvPr>
+        </p:nvSpPr>
+        <p:spPr/>
+        <p:txBody>
+          <a:bodyPr/>
+          <a:lstStyle/>
+          <a:p>
+            <a:r>
+              <a:rPr lang="en-US" dirty="0"/>
+              <a:t>Actuator</a:t>
+            </a:r>
+          </a:p>
+        </p:txBody>
+      </p:sp>
+      <p:pic>
+        <p:nvPicPr>
+          <p:cNvPr id="4" name="Content Placeholder 3">
+            <a:extLst>
+              <a:ext uri="{FF2B5EF4-FFF2-40B4-BE49-F238E27FC236}">
+                <a16:creationId xmlns:a16="http://schemas.microsoft.com/office/drawing/2014/main" id="{1A0803BB-FC91-4B3D-B92A-DBBD75F7D9AD}"/>
+              </a:ext>
+            </a:extLst>
+          </p:cNvPr>
+          <p:cNvPicPr>
+            <a:picLocks noGrp="1" noChangeAspect="1"/>
+          </p:cNvPicPr>
+          <p:nvPr>
+            <p:ph idx="1"/>
+          </p:nvPr>
+        </p:nvPicPr>
+        <p:blipFill>
+          <a:blip r:embed="rId2"/>
+          <a:stretch>
+            <a:fillRect/>
+          </a:stretch>
+        </p:blipFill>
+        <p:spPr>
+          <a:xfrm>
+            <a:off x="338324" y="1930400"/>
+            <a:ext cx="3784817" cy="2603429"/>
+          </a:xfrm>
+          <a:prstGeom prst="rect">
+            <a:avLst/>
+          </a:prstGeom>
+        </p:spPr>
+      </p:pic>
+      <p:pic>
+        <p:nvPicPr>
+          <p:cNvPr id="7" name="Picture 6">
+            <a:extLst>
+              <a:ext uri="{FF2B5EF4-FFF2-40B4-BE49-F238E27FC236}">
+                <a16:creationId xmlns:a16="http://schemas.microsoft.com/office/drawing/2014/main" id="{717F4F32-0679-4AB3-BD66-F826AA30B372}"/>
+              </a:ext>
+            </a:extLst>
+          </p:cNvPr>
+          <p:cNvPicPr>
+            <a:picLocks noChangeAspect="1"/>
+          </p:cNvPicPr>
+          <p:nvPr/>
+        </p:nvPicPr>
+        <p:blipFill>
+          <a:blip r:embed="rId3"/>
+          <a:stretch>
+            <a:fillRect/>
+          </a:stretch>
+        </p:blipFill>
+        <p:spPr>
+          <a:xfrm>
+            <a:off x="4975668" y="434109"/>
+            <a:ext cx="3214255" cy="5444836"/>
+          </a:xfrm>
+          <a:prstGeom prst="rect">
+            <a:avLst/>
+          </a:prstGeom>
+        </p:spPr>
+      </p:pic>
+      <p:pic>
+        <p:nvPicPr>
+          <p:cNvPr id="8" name="Picture 7">
+            <a:extLst>
+              <a:ext uri="{FF2B5EF4-FFF2-40B4-BE49-F238E27FC236}">
+                <a16:creationId xmlns:a16="http://schemas.microsoft.com/office/drawing/2014/main" id="{D5EE05B7-1840-4F41-AE6E-312560ECD2AE}"/>
+              </a:ext>
+            </a:extLst>
+          </p:cNvPr>
+          <p:cNvPicPr>
+            <a:picLocks noChangeAspect="1"/>
+          </p:cNvPicPr>
+          <p:nvPr/>
+        </p:nvPicPr>
+        <p:blipFill>
+          <a:blip r:embed="rId4"/>
+          <a:stretch>
+            <a:fillRect/>
+          </a:stretch>
+        </p:blipFill>
+        <p:spPr>
+          <a:xfrm>
+            <a:off x="8280400" y="1505527"/>
+            <a:ext cx="3247310" cy="3976110"/>
+          </a:xfrm>
+          <a:prstGeom prst="rect">
+            <a:avLst/>
+          </a:prstGeom>
+        </p:spPr>
+      </p:pic>
+    </p:spTree>
+    <p:extLst>
+      <p:ext uri="{BB962C8B-B14F-4D97-AF65-F5344CB8AC3E}">
+        <p14:creationId xmlns:p14="http://schemas.microsoft.com/office/powerpoint/2010/main" val="4154602147"/>
+      </p:ext>
+    </p:extLst>
+  </p:cSld>
+  <p:clrMapOvr>
+    <a:masterClrMapping/>
+  </p:clrMapOvr>
+</p:sld>
+</file>
+
+<file path=ppt/slides/slide19.xml><?xml version="1.0" encoding="utf-8"?>
+<p:sld xmlns:a="http://schemas.openxmlformats.org/drawingml/2006/main" xmlns:r="http://schemas.openxmlformats.org/officeDocument/2006/relationships" xmlns:p="http://schemas.openxmlformats.org/presentationml/2006/main">
+  <p:cSld>
+    <p:spTree>
+      <p:nvGrpSpPr>
+        <p:cNvPr id="1" name=""/>
+        <p:cNvGrpSpPr/>
+        <p:nvPr/>
+      </p:nvGrpSpPr>
+      <p:grpSpPr>
+        <a:xfrm>
+          <a:off x="0" y="0"/>
+          <a:ext cx="0" cy="0"/>
+          <a:chOff x="0" y="0"/>
+          <a:chExt cx="0" cy="0"/>
+        </a:xfrm>
+      </p:grpSpPr>
+      <p:sp>
+        <p:nvSpPr>
+          <p:cNvPr id="2" name="Title 1">
+            <a:extLst>
+              <a:ext uri="{FF2B5EF4-FFF2-40B4-BE49-F238E27FC236}">
+                <a16:creationId xmlns:a16="http://schemas.microsoft.com/office/drawing/2014/main" id="{212A6730-5296-4FC4-BDFC-A4FA36C3F543}"/>
+              </a:ext>
+            </a:extLst>
+          </p:cNvPr>
+          <p:cNvSpPr>
+            <a:spLocks noGrp="1"/>
+          </p:cNvSpPr>
+          <p:nvPr>
+            <p:ph type="title"/>
+          </p:nvPr>
+        </p:nvSpPr>
+        <p:spPr/>
+        <p:txBody>
+          <a:bodyPr/>
+          <a:lstStyle/>
+          <a:p>
+            <a:r>
+              <a:rPr lang="en-US" dirty="0"/>
+              <a:t>Unit Tests</a:t>
+            </a:r>
+          </a:p>
+        </p:txBody>
+      </p:sp>
+      <p:sp>
+        <p:nvSpPr>
+          <p:cNvPr id="3" name="Content Placeholder 2">
+            <a:extLst>
+              <a:ext uri="{FF2B5EF4-FFF2-40B4-BE49-F238E27FC236}">
+                <a16:creationId xmlns:a16="http://schemas.microsoft.com/office/drawing/2014/main" id="{7BA974A3-1D19-4E8E-B316-C120725102A7}"/>
+              </a:ext>
+            </a:extLst>
+          </p:cNvPr>
+          <p:cNvSpPr>
+            <a:spLocks noGrp="1"/>
+          </p:cNvSpPr>
+          <p:nvPr>
+            <p:ph idx="1"/>
+          </p:nvPr>
+        </p:nvSpPr>
+        <p:spPr/>
+        <p:txBody>
+          <a:bodyPr/>
+          <a:lstStyle/>
+          <a:p>
+            <a:r>
+              <a:rPr lang="en-US" dirty="0"/>
+              <a:t>TODO</a:t>
+            </a:r>
+          </a:p>
+          <a:p>
+            <a:endParaRPr lang="en-US" dirty="0"/>
+          </a:p>
+        </p:txBody>
+      </p:sp>
+      <p:pic>
+        <p:nvPicPr>
+          <p:cNvPr id="4" name="Picture 3">
+            <a:extLst>
+              <a:ext uri="{FF2B5EF4-FFF2-40B4-BE49-F238E27FC236}">
+                <a16:creationId xmlns:a16="http://schemas.microsoft.com/office/drawing/2014/main" id="{CBF3C293-699A-4BDD-BC96-2728AB3E59AA}"/>
+              </a:ext>
+            </a:extLst>
+          </p:cNvPr>
+          <p:cNvPicPr>
+            <a:picLocks noChangeAspect="1"/>
+          </p:cNvPicPr>
+          <p:nvPr/>
+        </p:nvPicPr>
+        <p:blipFill>
+          <a:blip r:embed="rId2"/>
+          <a:stretch>
+            <a:fillRect/>
+          </a:stretch>
+        </p:blipFill>
+        <p:spPr>
+          <a:xfrm>
+            <a:off x="3657600" y="2276937"/>
+            <a:ext cx="4876800" cy="3648075"/>
+          </a:xfrm>
+          <a:prstGeom prst="rect">
+            <a:avLst/>
+          </a:prstGeom>
+        </p:spPr>
+      </p:pic>
+    </p:spTree>
+    <p:extLst>
+      <p:ext uri="{BB962C8B-B14F-4D97-AF65-F5344CB8AC3E}">
+        <p14:creationId xmlns:p14="http://schemas.microsoft.com/office/powerpoint/2010/main" val="833500454"/>
+      </p:ext>
+    </p:extLst>
+  </p:cSld>
+  <p:clrMapOvr>
+    <a:masterClrMapping/>
+  </p:clrMapOvr>
+</p:sld>
+</file>
+
 <file path=ppt/slides/slide2.xml><?xml version="1.0" encoding="utf-8"?>
 <p:sld xmlns:a="http://schemas.openxmlformats.org/drawingml/2006/main" xmlns:r="http://schemas.openxmlformats.org/officeDocument/2006/relationships" xmlns:p="http://schemas.openxmlformats.org/presentationml/2006/main">
   <p:cSld>
@@ -10031,6 +10303,145 @@
     <p:extLst>
       <p:ext uri="{BB962C8B-B14F-4D97-AF65-F5344CB8AC3E}">
         <p14:creationId xmlns:p14="http://schemas.microsoft.com/office/powerpoint/2010/main" val="968158582"/>
+      </p:ext>
+    </p:extLst>
+  </p:cSld>
+  <p:clrMapOvr>
+    <a:masterClrMapping/>
+  </p:clrMapOvr>
+</p:sld>
+</file>
+
+<file path=ppt/slides/slide20.xml><?xml version="1.0" encoding="utf-8"?>
+<p:sld xmlns:a="http://schemas.openxmlformats.org/drawingml/2006/main" xmlns:r="http://schemas.openxmlformats.org/officeDocument/2006/relationships" xmlns:p="http://schemas.openxmlformats.org/presentationml/2006/main">
+  <p:cSld>
+    <p:spTree>
+      <p:nvGrpSpPr>
+        <p:cNvPr id="1" name=""/>
+        <p:cNvGrpSpPr/>
+        <p:nvPr/>
+      </p:nvGrpSpPr>
+      <p:grpSpPr>
+        <a:xfrm>
+          <a:off x="0" y="0"/>
+          <a:ext cx="0" cy="0"/>
+          <a:chOff x="0" y="0"/>
+          <a:chExt cx="0" cy="0"/>
+        </a:xfrm>
+      </p:grpSpPr>
+      <p:sp>
+        <p:nvSpPr>
+          <p:cNvPr id="2" name="Title 1">
+            <a:extLst>
+              <a:ext uri="{FF2B5EF4-FFF2-40B4-BE49-F238E27FC236}">
+                <a16:creationId xmlns:a16="http://schemas.microsoft.com/office/drawing/2014/main" id="{209F2BA3-9F84-4636-8D52-44D8D91F8520}"/>
+              </a:ext>
+            </a:extLst>
+          </p:cNvPr>
+          <p:cNvSpPr>
+            <a:spLocks noGrp="1"/>
+          </p:cNvSpPr>
+          <p:nvPr>
+            <p:ph type="title"/>
+          </p:nvPr>
+        </p:nvSpPr>
+        <p:spPr/>
+        <p:txBody>
+          <a:bodyPr/>
+          <a:lstStyle/>
+          <a:p>
+            <a:r>
+              <a:rPr lang="en-US" dirty="0"/>
+              <a:t>Best Practices</a:t>
+            </a:r>
+          </a:p>
+        </p:txBody>
+      </p:sp>
+      <p:sp>
+        <p:nvSpPr>
+          <p:cNvPr id="3" name="Content Placeholder 2">
+            <a:extLst>
+              <a:ext uri="{FF2B5EF4-FFF2-40B4-BE49-F238E27FC236}">
+                <a16:creationId xmlns:a16="http://schemas.microsoft.com/office/drawing/2014/main" id="{07C12C18-99A0-4498-BEC7-08C4E4B09C59}"/>
+              </a:ext>
+            </a:extLst>
+          </p:cNvPr>
+          <p:cNvSpPr>
+            <a:spLocks noGrp="1"/>
+          </p:cNvSpPr>
+          <p:nvPr>
+            <p:ph idx="1"/>
+          </p:nvPr>
+        </p:nvSpPr>
+        <p:spPr/>
+        <p:txBody>
+          <a:bodyPr>
+            <a:normAutofit lnSpcReduction="10000"/>
+          </a:bodyPr>
+          <a:lstStyle/>
+          <a:p>
+            <a:r>
+              <a:rPr lang="en-US" b="1" dirty="0"/>
+              <a:t>Make your database a detail – abstract it  from the core logic: </a:t>
+            </a:r>
+            <a:r>
+              <a:rPr lang="en-US" dirty="0"/>
+              <a:t>Database logic should be abstracted away from the Service. Ideally, you don’t want a Service to know what database it is talking to.</a:t>
+            </a:r>
+          </a:p>
+          <a:p>
+            <a:r>
+              <a:rPr lang="en-US" b="1" dirty="0"/>
+              <a:t>Keep your business logic free of Spring Boot code: </a:t>
+            </a:r>
+            <a:r>
+              <a:rPr lang="en-US" dirty="0"/>
+              <a:t>With the lessons from the “Clear Architecture” in mind, you should also protect your business logic. It is common for services to become libraries. These are much easier to create if you don’t have to remove a lot of Spring annotations from your code.</a:t>
+            </a:r>
+          </a:p>
+          <a:p>
+            <a:r>
+              <a:rPr lang="en-US" b="1" dirty="0"/>
+              <a:t>Constructor Injection: </a:t>
+            </a:r>
+            <a:r>
+              <a:rPr lang="en-US" dirty="0"/>
+              <a:t>One way to keep your business logic free from Spring Boot code is to rely on Constructor Injection. Not only is the </a:t>
+            </a:r>
+            <a:r>
+              <a:rPr lang="en-US" i="1" dirty="0"/>
+              <a:t>@</a:t>
+            </a:r>
+            <a:r>
+              <a:rPr lang="en-US" i="1" dirty="0" err="1"/>
+              <a:t>Autowired</a:t>
+            </a:r>
+            <a:r>
+              <a:rPr lang="en-US" dirty="0"/>
+              <a:t> annotation optional on constructors, you also get the benefit of being able to easily instantiate your bean without Spring.</a:t>
+            </a:r>
+          </a:p>
+          <a:p>
+            <a:r>
+              <a:rPr lang="en-US" dirty="0"/>
+              <a:t>In Spring Boot- Controllers and Services are by default Singletons. That introduces possible concurrency problems if you are not careful. </a:t>
+            </a:r>
+          </a:p>
+          <a:p>
+            <a:endParaRPr lang="en-US" b="1" dirty="0"/>
+          </a:p>
+          <a:p>
+            <a:pPr marL="0" indent="0">
+              <a:buNone/>
+            </a:pPr>
+            <a:endParaRPr lang="en-US" dirty="0"/>
+          </a:p>
+        </p:txBody>
+      </p:sp>
+    </p:spTree>
+    <p:extLst>
+      <p:ext uri="{BB962C8B-B14F-4D97-AF65-F5344CB8AC3E}">
+        <p14:creationId xmlns:p14="http://schemas.microsoft.com/office/powerpoint/2010/main" val="91602821"/>
       </p:ext>
     </p:extLst>
   </p:cSld>

</xml_diff>